<commit_message>
minor changes on scheme
</commit_message>
<xml_diff>
--- a/scheme_application_ecommerce_v0.2.pptx
+++ b/scheme_application_ecommerce_v0.2.pptx
@@ -261,7 +261,7 @@
           <a:p>
             <a:fld id="{ADD15EA4-10A8-4064-B787-C1B733FBD024}" type="datetimeFigureOut">
               <a:rPr lang="es-ES" smtClean="0"/>
-              <a:t>05/03/2020</a:t>
+              <a:t>08/03/2020</a:t>
             </a:fld>
             <a:endParaRPr lang="es-ES"/>
           </a:p>
@@ -459,7 +459,7 @@
           <a:p>
             <a:fld id="{ADD15EA4-10A8-4064-B787-C1B733FBD024}" type="datetimeFigureOut">
               <a:rPr lang="es-ES" smtClean="0"/>
-              <a:t>05/03/2020</a:t>
+              <a:t>08/03/2020</a:t>
             </a:fld>
             <a:endParaRPr lang="es-ES"/>
           </a:p>
@@ -667,7 +667,7 @@
           <a:p>
             <a:fld id="{ADD15EA4-10A8-4064-B787-C1B733FBD024}" type="datetimeFigureOut">
               <a:rPr lang="es-ES" smtClean="0"/>
-              <a:t>05/03/2020</a:t>
+              <a:t>08/03/2020</a:t>
             </a:fld>
             <a:endParaRPr lang="es-ES"/>
           </a:p>
@@ -865,7 +865,7 @@
           <a:p>
             <a:fld id="{ADD15EA4-10A8-4064-B787-C1B733FBD024}" type="datetimeFigureOut">
               <a:rPr lang="es-ES" smtClean="0"/>
-              <a:t>05/03/2020</a:t>
+              <a:t>08/03/2020</a:t>
             </a:fld>
             <a:endParaRPr lang="es-ES"/>
           </a:p>
@@ -1140,7 +1140,7 @@
           <a:p>
             <a:fld id="{ADD15EA4-10A8-4064-B787-C1B733FBD024}" type="datetimeFigureOut">
               <a:rPr lang="es-ES" smtClean="0"/>
-              <a:t>05/03/2020</a:t>
+              <a:t>08/03/2020</a:t>
             </a:fld>
             <a:endParaRPr lang="es-ES"/>
           </a:p>
@@ -1405,7 +1405,7 @@
           <a:p>
             <a:fld id="{ADD15EA4-10A8-4064-B787-C1B733FBD024}" type="datetimeFigureOut">
               <a:rPr lang="es-ES" smtClean="0"/>
-              <a:t>05/03/2020</a:t>
+              <a:t>08/03/2020</a:t>
             </a:fld>
             <a:endParaRPr lang="es-ES"/>
           </a:p>
@@ -1817,7 +1817,7 @@
           <a:p>
             <a:fld id="{ADD15EA4-10A8-4064-B787-C1B733FBD024}" type="datetimeFigureOut">
               <a:rPr lang="es-ES" smtClean="0"/>
-              <a:t>05/03/2020</a:t>
+              <a:t>08/03/2020</a:t>
             </a:fld>
             <a:endParaRPr lang="es-ES"/>
           </a:p>
@@ -1958,7 +1958,7 @@
           <a:p>
             <a:fld id="{ADD15EA4-10A8-4064-B787-C1B733FBD024}" type="datetimeFigureOut">
               <a:rPr lang="es-ES" smtClean="0"/>
-              <a:t>05/03/2020</a:t>
+              <a:t>08/03/2020</a:t>
             </a:fld>
             <a:endParaRPr lang="es-ES"/>
           </a:p>
@@ -2071,7 +2071,7 @@
           <a:p>
             <a:fld id="{ADD15EA4-10A8-4064-B787-C1B733FBD024}" type="datetimeFigureOut">
               <a:rPr lang="es-ES" smtClean="0"/>
-              <a:t>05/03/2020</a:t>
+              <a:t>08/03/2020</a:t>
             </a:fld>
             <a:endParaRPr lang="es-ES"/>
           </a:p>
@@ -2382,7 +2382,7 @@
           <a:p>
             <a:fld id="{ADD15EA4-10A8-4064-B787-C1B733FBD024}" type="datetimeFigureOut">
               <a:rPr lang="es-ES" smtClean="0"/>
-              <a:t>05/03/2020</a:t>
+              <a:t>08/03/2020</a:t>
             </a:fld>
             <a:endParaRPr lang="es-ES"/>
           </a:p>
@@ -2670,7 +2670,7 @@
           <a:p>
             <a:fld id="{ADD15EA4-10A8-4064-B787-C1B733FBD024}" type="datetimeFigureOut">
               <a:rPr lang="es-ES" smtClean="0"/>
-              <a:t>05/03/2020</a:t>
+              <a:t>08/03/2020</a:t>
             </a:fld>
             <a:endParaRPr lang="es-ES"/>
           </a:p>
@@ -2911,7 +2911,7 @@
           <a:p>
             <a:fld id="{ADD15EA4-10A8-4064-B787-C1B733FBD024}" type="datetimeFigureOut">
               <a:rPr lang="es-ES" smtClean="0"/>
-              <a:t>05/03/2020</a:t>
+              <a:t>08/03/2020</a:t>
             </a:fld>
             <a:endParaRPr lang="es-ES"/>
           </a:p>
@@ -8624,7 +8624,7 @@
         </p:nvSpPr>
         <p:spPr>
           <a:xfrm>
-            <a:off x="8990017" y="3984289"/>
+            <a:off x="8964850" y="3975900"/>
             <a:ext cx="461395" cy="258579"/>
           </a:xfrm>
           <a:prstGeom prst="rect">
@@ -8974,6 +8974,164 @@
             <a:r>
               <a:rPr lang="en-GB" sz="1000" dirty="0"/>
               <a:t>Invoices</a:t>
+            </a:r>
+            <a:endParaRPr lang="es-ES" sz="1000" dirty="0"/>
+          </a:p>
+        </p:txBody>
+      </p:sp>
+      <p:cxnSp>
+        <p:nvCxnSpPr>
+          <p:cNvPr id="4" name="Conector recto de flecha 3">
+            <a:extLst>
+              <a:ext uri="{FF2B5EF4-FFF2-40B4-BE49-F238E27FC236}">
+                <a16:creationId xmlns:a16="http://schemas.microsoft.com/office/drawing/2014/main" id="{E796BF41-E0F5-4D0A-B0DF-3C2BE5DE47AF}"/>
+              </a:ext>
+            </a:extLst>
+          </p:cNvPr>
+          <p:cNvCxnSpPr>
+            <a:cxnSpLocks/>
+            <a:stCxn id="31" idx="2"/>
+          </p:cNvCxnSpPr>
+          <p:nvPr/>
+        </p:nvCxnSpPr>
+        <p:spPr>
+          <a:xfrm flipH="1">
+            <a:off x="11232860" y="3164945"/>
+            <a:ext cx="1" cy="528111"/>
+          </a:xfrm>
+          <a:prstGeom prst="straightConnector1">
+            <a:avLst/>
+          </a:prstGeom>
+          <a:ln>
+            <a:tailEnd type="triangle"/>
+          </a:ln>
+        </p:spPr>
+        <p:style>
+          <a:lnRef idx="1">
+            <a:schemeClr val="accent1"/>
+          </a:lnRef>
+          <a:fillRef idx="0">
+            <a:schemeClr val="accent1"/>
+          </a:fillRef>
+          <a:effectRef idx="0">
+            <a:schemeClr val="accent1"/>
+          </a:effectRef>
+          <a:fontRef idx="minor">
+            <a:schemeClr val="tx1"/>
+          </a:fontRef>
+        </p:style>
+      </p:cxnSp>
+      <p:sp>
+        <p:nvSpPr>
+          <p:cNvPr id="91" name="Rectángulo 90">
+            <a:extLst>
+              <a:ext uri="{FF2B5EF4-FFF2-40B4-BE49-F238E27FC236}">
+                <a16:creationId xmlns:a16="http://schemas.microsoft.com/office/drawing/2014/main" id="{5A4DCFA2-4AB2-4A57-AF98-291880E53D31}"/>
+              </a:ext>
+            </a:extLst>
+          </p:cNvPr>
+          <p:cNvSpPr/>
+          <p:nvPr/>
+        </p:nvSpPr>
+        <p:spPr>
+          <a:xfrm>
+            <a:off x="11002162" y="3717296"/>
+            <a:ext cx="461395" cy="258579"/>
+          </a:xfrm>
+          <a:prstGeom prst="rect">
+            <a:avLst/>
+          </a:prstGeom>
+          <a:solidFill>
+            <a:srgbClr val="FF0000"/>
+          </a:solidFill>
+          <a:ln>
+            <a:solidFill>
+              <a:srgbClr val="FF0000"/>
+            </a:solidFill>
+          </a:ln>
+        </p:spPr>
+        <p:style>
+          <a:lnRef idx="2">
+            <a:schemeClr val="accent1">
+              <a:shade val="50000"/>
+            </a:schemeClr>
+          </a:lnRef>
+          <a:fillRef idx="1">
+            <a:schemeClr val="accent1"/>
+          </a:fillRef>
+          <a:effectRef idx="0">
+            <a:schemeClr val="accent1"/>
+          </a:effectRef>
+          <a:fontRef idx="minor">
+            <a:schemeClr val="lt1"/>
+          </a:fontRef>
+        </p:style>
+        <p:txBody>
+          <a:bodyPr rtlCol="0" anchor="ctr"/>
+          <a:lstStyle/>
+          <a:p>
+            <a:pPr algn="ctr"/>
+            <a:r>
+              <a:rPr lang="en-GB" sz="1000" dirty="0"/>
+              <a:t>Bean</a:t>
+            </a:r>
+            <a:endParaRPr lang="es-ES" sz="1000" dirty="0"/>
+          </a:p>
+        </p:txBody>
+      </p:sp>
+      <p:sp>
+        <p:nvSpPr>
+          <p:cNvPr id="101" name="Rectángulo 100">
+            <a:extLst>
+              <a:ext uri="{FF2B5EF4-FFF2-40B4-BE49-F238E27FC236}">
+                <a16:creationId xmlns:a16="http://schemas.microsoft.com/office/drawing/2014/main" id="{5C392B28-776E-46A5-9B32-24FF51FF1580}"/>
+              </a:ext>
+            </a:extLst>
+          </p:cNvPr>
+          <p:cNvSpPr/>
+          <p:nvPr/>
+        </p:nvSpPr>
+        <p:spPr>
+          <a:xfrm>
+            <a:off x="6614185" y="3554249"/>
+            <a:ext cx="461395" cy="258579"/>
+          </a:xfrm>
+          <a:prstGeom prst="rect">
+            <a:avLst/>
+          </a:prstGeom>
+          <a:solidFill>
+            <a:srgbClr val="FF0000"/>
+          </a:solidFill>
+          <a:ln>
+            <a:solidFill>
+              <a:srgbClr val="FF0000"/>
+            </a:solidFill>
+          </a:ln>
+        </p:spPr>
+        <p:style>
+          <a:lnRef idx="2">
+            <a:schemeClr val="accent1">
+              <a:shade val="50000"/>
+            </a:schemeClr>
+          </a:lnRef>
+          <a:fillRef idx="1">
+            <a:schemeClr val="accent1"/>
+          </a:fillRef>
+          <a:effectRef idx="0">
+            <a:schemeClr val="accent1"/>
+          </a:effectRef>
+          <a:fontRef idx="minor">
+            <a:schemeClr val="lt1"/>
+          </a:fontRef>
+        </p:style>
+        <p:txBody>
+          <a:bodyPr rtlCol="0" anchor="ctr"/>
+          <a:lstStyle/>
+          <a:p>
+            <a:pPr algn="ctr"/>
+            <a:r>
+              <a:rPr lang="en-GB" sz="1000" dirty="0"/>
+              <a:t>View</a:t>
             </a:r>
             <a:endParaRPr lang="es-ES" sz="1000" dirty="0"/>
           </a:p>
@@ -10748,10 +10906,160 @@
       </p:sp>
       <p:sp>
         <p:nvSpPr>
-          <p:cNvPr id="53" name="Rectángulo 52">
-            <a:extLst>
-              <a:ext uri="{FF2B5EF4-FFF2-40B4-BE49-F238E27FC236}">
-                <a16:creationId xmlns:a16="http://schemas.microsoft.com/office/drawing/2014/main" id="{2E11EC1B-209C-4EC0-A432-8E12A720DF90}"/>
+          <p:cNvPr id="54" name="CuadroTexto 53">
+            <a:extLst>
+              <a:ext uri="{FF2B5EF4-FFF2-40B4-BE49-F238E27FC236}">
+                <a16:creationId xmlns:a16="http://schemas.microsoft.com/office/drawing/2014/main" id="{3D6CACD7-5E16-40D2-9AF7-731D50E5C5F1}"/>
+              </a:ext>
+            </a:extLst>
+          </p:cNvPr>
+          <p:cNvSpPr txBox="1"/>
+          <p:nvPr/>
+        </p:nvSpPr>
+        <p:spPr>
+          <a:xfrm>
+            <a:off x="9722840" y="5346766"/>
+            <a:ext cx="1950441" cy="400110"/>
+          </a:xfrm>
+          <a:prstGeom prst="rect">
+            <a:avLst/>
+          </a:prstGeom>
+          <a:noFill/>
+        </p:spPr>
+        <p:txBody>
+          <a:bodyPr wrap="square" rtlCol="0">
+            <a:spAutoFit/>
+          </a:bodyPr>
+          <a:lstStyle/>
+          <a:p>
+            <a:r>
+              <a:rPr lang="es-ES" sz="1000" dirty="0" err="1"/>
+              <a:t>Persistence</a:t>
+            </a:r>
+            <a:r>
+              <a:rPr lang="es-ES" sz="1000" dirty="0"/>
+              <a:t> </a:t>
+            </a:r>
+            <a:r>
+              <a:rPr lang="es-ES" sz="1000" dirty="0">
+                <a:sym typeface="Wingdings" panose="05000000000000000000" pitchFamily="2" charset="2"/>
+              </a:rPr>
+              <a:t> </a:t>
+            </a:r>
+            <a:r>
+              <a:rPr lang="es-ES" sz="1000" dirty="0" err="1">
+                <a:sym typeface="Wingdings" panose="05000000000000000000" pitchFamily="2" charset="2"/>
+              </a:rPr>
+              <a:t>all</a:t>
+            </a:r>
+            <a:r>
+              <a:rPr lang="es-ES" sz="1000" dirty="0">
+                <a:sym typeface="Wingdings" panose="05000000000000000000" pitchFamily="2" charset="2"/>
+              </a:rPr>
+              <a:t> </a:t>
+            </a:r>
+            <a:r>
+              <a:rPr lang="es-ES" sz="1000" dirty="0" err="1">
+                <a:sym typeface="Wingdings" panose="05000000000000000000" pitchFamily="2" charset="2"/>
+              </a:rPr>
+              <a:t>order</a:t>
+            </a:r>
+            <a:r>
+              <a:rPr lang="es-ES" sz="1000" dirty="0">
+                <a:sym typeface="Wingdings" panose="05000000000000000000" pitchFamily="2" charset="2"/>
+              </a:rPr>
+              <a:t> </a:t>
+            </a:r>
+            <a:r>
+              <a:rPr lang="es-ES" sz="1000" dirty="0" err="1">
+                <a:sym typeface="Wingdings" panose="05000000000000000000" pitchFamily="2" charset="2"/>
+              </a:rPr>
+              <a:t>dateils</a:t>
+            </a:r>
+            <a:r>
+              <a:rPr lang="es-ES" sz="1000" dirty="0">
+                <a:sym typeface="Wingdings" panose="05000000000000000000" pitchFamily="2" charset="2"/>
+              </a:rPr>
+              <a:t> (</a:t>
+            </a:r>
+            <a:r>
+              <a:rPr lang="es-ES" sz="1000" dirty="0" err="1">
+                <a:sym typeface="Wingdings" panose="05000000000000000000" pitchFamily="2" charset="2"/>
+              </a:rPr>
+              <a:t>with</a:t>
+            </a:r>
+            <a:r>
+              <a:rPr lang="es-ES" sz="1000" dirty="0">
+                <a:sym typeface="Wingdings" panose="05000000000000000000" pitchFamily="2" charset="2"/>
+              </a:rPr>
+              <a:t> </a:t>
+            </a:r>
+            <a:r>
+              <a:rPr lang="es-ES" sz="1000" dirty="0" err="1">
+                <a:sym typeface="Wingdings" panose="05000000000000000000" pitchFamily="2" charset="2"/>
+              </a:rPr>
+              <a:t>relations</a:t>
+            </a:r>
+            <a:r>
+              <a:rPr lang="es-ES" sz="1000" dirty="0">
+                <a:sym typeface="Wingdings" panose="05000000000000000000" pitchFamily="2" charset="2"/>
+              </a:rPr>
+              <a:t>)</a:t>
+            </a:r>
+            <a:endParaRPr lang="es-ES" sz="1000" dirty="0"/>
+          </a:p>
+        </p:txBody>
+      </p:sp>
+      <p:sp>
+        <p:nvSpPr>
+          <p:cNvPr id="58" name="CuadroTexto 57">
+            <a:extLst>
+              <a:ext uri="{FF2B5EF4-FFF2-40B4-BE49-F238E27FC236}">
+                <a16:creationId xmlns:a16="http://schemas.microsoft.com/office/drawing/2014/main" id="{61D58DEF-72A0-474E-B5C7-C5C2D1F38E7C}"/>
+              </a:ext>
+            </a:extLst>
+          </p:cNvPr>
+          <p:cNvSpPr txBox="1"/>
+          <p:nvPr/>
+        </p:nvSpPr>
+        <p:spPr>
+          <a:xfrm>
+            <a:off x="9777718" y="5855393"/>
+            <a:ext cx="1712754" cy="246221"/>
+          </a:xfrm>
+          <a:prstGeom prst="rect">
+            <a:avLst/>
+          </a:prstGeom>
+          <a:noFill/>
+        </p:spPr>
+        <p:txBody>
+          <a:bodyPr wrap="square" rtlCol="0">
+            <a:spAutoFit/>
+          </a:bodyPr>
+          <a:lstStyle/>
+          <a:p>
+            <a:r>
+              <a:rPr lang="es-ES" sz="1000" dirty="0" err="1"/>
+              <a:t>Export</a:t>
+            </a:r>
+            <a:r>
+              <a:rPr lang="es-ES" sz="1000" dirty="0"/>
+              <a:t> .</a:t>
+            </a:r>
+            <a:r>
+              <a:rPr lang="es-ES" sz="1000" dirty="0" err="1"/>
+              <a:t>pdf</a:t>
+            </a:r>
+            <a:endParaRPr lang="es-ES" sz="1000" dirty="0"/>
+          </a:p>
+        </p:txBody>
+      </p:sp>
+      <p:sp>
+        <p:nvSpPr>
+          <p:cNvPr id="40" name="Rectángulo 39">
+            <a:extLst>
+              <a:ext uri="{FF2B5EF4-FFF2-40B4-BE49-F238E27FC236}">
+                <a16:creationId xmlns:a16="http://schemas.microsoft.com/office/drawing/2014/main" id="{5FB9CACB-BC16-46FB-82E0-8C2CB89024FD}"/>
               </a:ext>
             </a:extLst>
           </p:cNvPr>
@@ -10760,8 +11068,8 @@
         </p:nvSpPr>
         <p:spPr>
           <a:xfrm>
-            <a:off x="11168542" y="4999839"/>
-            <a:ext cx="461395" cy="426774"/>
+            <a:off x="11153862" y="4979670"/>
+            <a:ext cx="461395" cy="258579"/>
           </a:xfrm>
           <a:prstGeom prst="rect">
             <a:avLst/>
@@ -10799,156 +11107,6 @@
             <a:r>
               <a:rPr lang="en-GB" sz="1000" dirty="0"/>
               <a:t>JPA</a:t>
-            </a:r>
-            <a:endParaRPr lang="es-ES" sz="1000" dirty="0"/>
-          </a:p>
-        </p:txBody>
-      </p:sp>
-      <p:sp>
-        <p:nvSpPr>
-          <p:cNvPr id="54" name="CuadroTexto 53">
-            <a:extLst>
-              <a:ext uri="{FF2B5EF4-FFF2-40B4-BE49-F238E27FC236}">
-                <a16:creationId xmlns:a16="http://schemas.microsoft.com/office/drawing/2014/main" id="{3D6CACD7-5E16-40D2-9AF7-731D50E5C5F1}"/>
-              </a:ext>
-            </a:extLst>
-          </p:cNvPr>
-          <p:cNvSpPr txBox="1"/>
-          <p:nvPr/>
-        </p:nvSpPr>
-        <p:spPr>
-          <a:xfrm>
-            <a:off x="9722840" y="5346766"/>
-            <a:ext cx="1950441" cy="400110"/>
-          </a:xfrm>
-          <a:prstGeom prst="rect">
-            <a:avLst/>
-          </a:prstGeom>
-          <a:noFill/>
-        </p:spPr>
-        <p:txBody>
-          <a:bodyPr wrap="square" rtlCol="0">
-            <a:spAutoFit/>
-          </a:bodyPr>
-          <a:lstStyle/>
-          <a:p>
-            <a:r>
-              <a:rPr lang="es-ES" sz="1000" dirty="0" err="1"/>
-              <a:t>Persistence</a:t>
-            </a:r>
-            <a:r>
-              <a:rPr lang="es-ES" sz="1000" dirty="0"/>
-              <a:t> </a:t>
-            </a:r>
-            <a:r>
-              <a:rPr lang="es-ES" sz="1000" dirty="0">
-                <a:sym typeface="Wingdings" panose="05000000000000000000" pitchFamily="2" charset="2"/>
-              </a:rPr>
-              <a:t> </a:t>
-            </a:r>
-            <a:r>
-              <a:rPr lang="es-ES" sz="1000" dirty="0" err="1">
-                <a:sym typeface="Wingdings" panose="05000000000000000000" pitchFamily="2" charset="2"/>
-              </a:rPr>
-              <a:t>all</a:t>
-            </a:r>
-            <a:r>
-              <a:rPr lang="es-ES" sz="1000" dirty="0">
-                <a:sym typeface="Wingdings" panose="05000000000000000000" pitchFamily="2" charset="2"/>
-              </a:rPr>
-              <a:t> </a:t>
-            </a:r>
-            <a:r>
-              <a:rPr lang="es-ES" sz="1000" dirty="0" err="1">
-                <a:sym typeface="Wingdings" panose="05000000000000000000" pitchFamily="2" charset="2"/>
-              </a:rPr>
-              <a:t>order</a:t>
-            </a:r>
-            <a:r>
-              <a:rPr lang="es-ES" sz="1000" dirty="0">
-                <a:sym typeface="Wingdings" panose="05000000000000000000" pitchFamily="2" charset="2"/>
-              </a:rPr>
-              <a:t> </a:t>
-            </a:r>
-            <a:r>
-              <a:rPr lang="es-ES" sz="1000" dirty="0" err="1">
-                <a:sym typeface="Wingdings" panose="05000000000000000000" pitchFamily="2" charset="2"/>
-              </a:rPr>
-              <a:t>dateils</a:t>
-            </a:r>
-            <a:r>
-              <a:rPr lang="es-ES" sz="1000" dirty="0">
-                <a:sym typeface="Wingdings" panose="05000000000000000000" pitchFamily="2" charset="2"/>
-              </a:rPr>
-              <a:t> (</a:t>
-            </a:r>
-            <a:r>
-              <a:rPr lang="es-ES" sz="1000" dirty="0" err="1">
-                <a:sym typeface="Wingdings" panose="05000000000000000000" pitchFamily="2" charset="2"/>
-              </a:rPr>
-              <a:t>with</a:t>
-            </a:r>
-            <a:r>
-              <a:rPr lang="es-ES" sz="1000" dirty="0">
-                <a:sym typeface="Wingdings" panose="05000000000000000000" pitchFamily="2" charset="2"/>
-              </a:rPr>
-              <a:t> </a:t>
-            </a:r>
-            <a:r>
-              <a:rPr lang="es-ES" sz="1000" dirty="0" err="1">
-                <a:sym typeface="Wingdings" panose="05000000000000000000" pitchFamily="2" charset="2"/>
-              </a:rPr>
-              <a:t>relations</a:t>
-            </a:r>
-            <a:r>
-              <a:rPr lang="es-ES" sz="1000" dirty="0">
-                <a:sym typeface="Wingdings" panose="05000000000000000000" pitchFamily="2" charset="2"/>
-              </a:rPr>
-              <a:t>)</a:t>
-            </a:r>
-            <a:endParaRPr lang="es-ES" sz="1000" dirty="0"/>
-          </a:p>
-        </p:txBody>
-      </p:sp>
-      <p:sp>
-        <p:nvSpPr>
-          <p:cNvPr id="58" name="CuadroTexto 57">
-            <a:extLst>
-              <a:ext uri="{FF2B5EF4-FFF2-40B4-BE49-F238E27FC236}">
-                <a16:creationId xmlns:a16="http://schemas.microsoft.com/office/drawing/2014/main" id="{61D58DEF-72A0-474E-B5C7-C5C2D1F38E7C}"/>
-              </a:ext>
-            </a:extLst>
-          </p:cNvPr>
-          <p:cNvSpPr txBox="1"/>
-          <p:nvPr/>
-        </p:nvSpPr>
-        <p:spPr>
-          <a:xfrm>
-            <a:off x="9777718" y="5855393"/>
-            <a:ext cx="1712754" cy="246221"/>
-          </a:xfrm>
-          <a:prstGeom prst="rect">
-            <a:avLst/>
-          </a:prstGeom>
-          <a:noFill/>
-        </p:spPr>
-        <p:txBody>
-          <a:bodyPr wrap="square" rtlCol="0">
-            <a:spAutoFit/>
-          </a:bodyPr>
-          <a:lstStyle/>
-          <a:p>
-            <a:r>
-              <a:rPr lang="es-ES" sz="1000" dirty="0" err="1"/>
-              <a:t>Export</a:t>
-            </a:r>
-            <a:r>
-              <a:rPr lang="es-ES" sz="1000" dirty="0"/>
-              <a:t> .</a:t>
-            </a:r>
-            <a:r>
-              <a:rPr lang="es-ES" sz="1000" dirty="0" err="1"/>
-              <a:t>pdf</a:t>
             </a:r>
             <a:endParaRPr lang="es-ES" sz="1000" dirty="0"/>
           </a:p>

</xml_diff>